<commit_message>
Sửa boudaries system trong slide 10 của file present01 Thêm file present Progress Report
</commit_message>
<xml_diff>
--- a/document/Presentation/Present01.pptx
+++ b/document/Presentation/Present01.pptx
@@ -209,7 +209,7 @@
           <a:p>
             <a:fld id="{F7C53F99-3295-4F77-8A9B-D1FA4F3029DF}" type="datetimeFigureOut">
               <a:rPr lang="en-US" smtClean="0"/>
-              <a:t>5/23/2016</a:t>
+              <a:t>5/24/2016</a:t>
             </a:fld>
             <a:endParaRPr lang="en-US"/>
           </a:p>
@@ -2680,7 +2680,7 @@
           <a:p>
             <a:fld id="{99C8624C-1EBE-4CE4-9B5E-4E5B8FBFAF31}" type="datetimeFigureOut">
               <a:rPr lang="en-US" smtClean="0"/>
-              <a:t>5/23/2016</a:t>
+              <a:t>5/24/2016</a:t>
             </a:fld>
             <a:endParaRPr lang="en-US"/>
           </a:p>
@@ -2848,7 +2848,7 @@
           <a:p>
             <a:fld id="{99C8624C-1EBE-4CE4-9B5E-4E5B8FBFAF31}" type="datetimeFigureOut">
               <a:rPr lang="en-US" smtClean="0"/>
-              <a:t>5/23/2016</a:t>
+              <a:t>5/24/2016</a:t>
             </a:fld>
             <a:endParaRPr lang="en-US"/>
           </a:p>
@@ -3026,7 +3026,7 @@
           <a:p>
             <a:fld id="{99C8624C-1EBE-4CE4-9B5E-4E5B8FBFAF31}" type="datetimeFigureOut">
               <a:rPr lang="en-US" smtClean="0"/>
-              <a:t>5/23/2016</a:t>
+              <a:t>5/24/2016</a:t>
             </a:fld>
             <a:endParaRPr lang="en-US"/>
           </a:p>
@@ -3194,7 +3194,7 @@
           <a:p>
             <a:fld id="{99C8624C-1EBE-4CE4-9B5E-4E5B8FBFAF31}" type="datetimeFigureOut">
               <a:rPr lang="en-US" smtClean="0"/>
-              <a:t>5/23/2016</a:t>
+              <a:t>5/24/2016</a:t>
             </a:fld>
             <a:endParaRPr lang="en-US"/>
           </a:p>
@@ -3439,7 +3439,7 @@
           <a:p>
             <a:fld id="{99C8624C-1EBE-4CE4-9B5E-4E5B8FBFAF31}" type="datetimeFigureOut">
               <a:rPr lang="en-US" smtClean="0"/>
-              <a:t>5/23/2016</a:t>
+              <a:t>5/24/2016</a:t>
             </a:fld>
             <a:endParaRPr lang="en-US"/>
           </a:p>
@@ -3668,7 +3668,7 @@
           <a:p>
             <a:fld id="{99C8624C-1EBE-4CE4-9B5E-4E5B8FBFAF31}" type="datetimeFigureOut">
               <a:rPr lang="en-US" smtClean="0"/>
-              <a:t>5/23/2016</a:t>
+              <a:t>5/24/2016</a:t>
             </a:fld>
             <a:endParaRPr lang="en-US"/>
           </a:p>
@@ -4032,7 +4032,7 @@
           <a:p>
             <a:fld id="{99C8624C-1EBE-4CE4-9B5E-4E5B8FBFAF31}" type="datetimeFigureOut">
               <a:rPr lang="en-US" smtClean="0"/>
-              <a:t>5/23/2016</a:t>
+              <a:t>5/24/2016</a:t>
             </a:fld>
             <a:endParaRPr lang="en-US"/>
           </a:p>
@@ -4149,7 +4149,7 @@
           <a:p>
             <a:fld id="{99C8624C-1EBE-4CE4-9B5E-4E5B8FBFAF31}" type="datetimeFigureOut">
               <a:rPr lang="en-US" smtClean="0"/>
-              <a:t>5/23/2016</a:t>
+              <a:t>5/24/2016</a:t>
             </a:fld>
             <a:endParaRPr lang="en-US"/>
           </a:p>
@@ -4244,7 +4244,7 @@
           <a:p>
             <a:fld id="{99C8624C-1EBE-4CE4-9B5E-4E5B8FBFAF31}" type="datetimeFigureOut">
               <a:rPr lang="en-US" smtClean="0"/>
-              <a:t>5/23/2016</a:t>
+              <a:t>5/24/2016</a:t>
             </a:fld>
             <a:endParaRPr lang="en-US"/>
           </a:p>
@@ -4519,7 +4519,7 @@
           <a:p>
             <a:fld id="{99C8624C-1EBE-4CE4-9B5E-4E5B8FBFAF31}" type="datetimeFigureOut">
               <a:rPr lang="en-US" smtClean="0"/>
-              <a:t>5/23/2016</a:t>
+              <a:t>5/24/2016</a:t>
             </a:fld>
             <a:endParaRPr lang="en-US"/>
           </a:p>
@@ -4771,7 +4771,7 @@
           <a:p>
             <a:fld id="{99C8624C-1EBE-4CE4-9B5E-4E5B8FBFAF31}" type="datetimeFigureOut">
               <a:rPr lang="en-US" smtClean="0"/>
-              <a:t>5/23/2016</a:t>
+              <a:t>5/24/2016</a:t>
             </a:fld>
             <a:endParaRPr lang="en-US"/>
           </a:p>
@@ -4982,7 +4982,7 @@
           <a:p>
             <a:fld id="{99C8624C-1EBE-4CE4-9B5E-4E5B8FBFAF31}" type="datetimeFigureOut">
               <a:rPr lang="en-US" smtClean="0"/>
-              <a:t>5/23/2016</a:t>
+              <a:t>5/24/2016</a:t>
             </a:fld>
             <a:endParaRPr lang="en-US"/>
           </a:p>
@@ -5458,6 +5458,342 @@
           <a:chExt cx="0" cy="0"/>
         </a:xfrm>
       </p:grpSpPr>
+      <p:grpSp>
+        <p:nvGrpSpPr>
+          <p:cNvPr id="78" name="Group 77"/>
+          <p:cNvGrpSpPr/>
+          <p:nvPr/>
+        </p:nvGrpSpPr>
+        <p:grpSpPr>
+          <a:xfrm>
+            <a:off x="3348346" y="1936549"/>
+            <a:ext cx="1716533" cy="1012173"/>
+            <a:chOff x="3803165" y="83094"/>
+            <a:chExt cx="1716533" cy="1012173"/>
+          </a:xfrm>
+        </p:grpSpPr>
+        <p:pic>
+          <p:nvPicPr>
+            <p:cNvPr id="79" name="Picture 78"/>
+            <p:cNvPicPr>
+              <a:picLocks noChangeAspect="1"/>
+            </p:cNvPicPr>
+            <p:nvPr/>
+          </p:nvPicPr>
+          <p:blipFill>
+            <a:blip r:embed="rId3" cstate="print">
+              <a:extLst>
+                <a:ext uri="{28A0092B-C50C-407E-A947-70E740481C1C}">
+                  <a14:useLocalDpi xmlns:a14="http://schemas.microsoft.com/office/drawing/2010/main" val="0"/>
+                </a:ext>
+              </a:extLst>
+            </a:blip>
+            <a:stretch>
+              <a:fillRect/>
+            </a:stretch>
+          </p:blipFill>
+          <p:spPr>
+            <a:xfrm>
+              <a:off x="3803165" y="143982"/>
+              <a:ext cx="709744" cy="709744"/>
+            </a:xfrm>
+            <a:prstGeom prst="rect">
+              <a:avLst/>
+            </a:prstGeom>
+          </p:spPr>
+        </p:pic>
+        <p:cxnSp>
+          <p:nvCxnSpPr>
+            <p:cNvPr id="80" name="Straight Arrow Connector 79"/>
+            <p:cNvCxnSpPr/>
+            <p:nvPr/>
+          </p:nvCxnSpPr>
+          <p:spPr>
+            <a:xfrm flipV="1">
+              <a:off x="4361839" y="428779"/>
+              <a:ext cx="347772" cy="4342"/>
+            </a:xfrm>
+            <a:prstGeom prst="straightConnector1">
+              <a:avLst/>
+            </a:prstGeom>
+            <a:ln>
+              <a:tailEnd type="triangle"/>
+            </a:ln>
+          </p:spPr>
+          <p:style>
+            <a:lnRef idx="1">
+              <a:schemeClr val="accent1"/>
+            </a:lnRef>
+            <a:fillRef idx="0">
+              <a:schemeClr val="accent1"/>
+            </a:fillRef>
+            <a:effectRef idx="0">
+              <a:schemeClr val="accent1"/>
+            </a:effectRef>
+            <a:fontRef idx="minor">
+              <a:schemeClr val="tx1"/>
+            </a:fontRef>
+          </p:style>
+        </p:cxnSp>
+        <p:pic>
+          <p:nvPicPr>
+            <p:cNvPr id="81" name="Picture 80"/>
+            <p:cNvPicPr>
+              <a:picLocks noChangeAspect="1"/>
+            </p:cNvPicPr>
+            <p:nvPr/>
+          </p:nvPicPr>
+          <p:blipFill>
+            <a:blip r:embed="rId4">
+              <a:extLst>
+                <a:ext uri="{28A0092B-C50C-407E-A947-70E740481C1C}">
+                  <a14:useLocalDpi xmlns:a14="http://schemas.microsoft.com/office/drawing/2010/main" val="0"/>
+                </a:ext>
+              </a:extLst>
+            </a:blip>
+            <a:stretch>
+              <a:fillRect/>
+            </a:stretch>
+          </p:blipFill>
+          <p:spPr>
+            <a:xfrm>
+              <a:off x="4709611" y="83094"/>
+              <a:ext cx="709744" cy="709744"/>
+            </a:xfrm>
+            <a:prstGeom prst="rect">
+              <a:avLst/>
+            </a:prstGeom>
+          </p:spPr>
+        </p:pic>
+        <p:sp>
+          <p:nvSpPr>
+            <p:cNvPr id="82" name="TextBox 81"/>
+            <p:cNvSpPr txBox="1"/>
+            <p:nvPr/>
+          </p:nvSpPr>
+          <p:spPr>
+            <a:xfrm>
+              <a:off x="3939266" y="634354"/>
+              <a:ext cx="541238" cy="307777"/>
+            </a:xfrm>
+            <a:prstGeom prst="rect">
+              <a:avLst/>
+            </a:prstGeom>
+            <a:noFill/>
+          </p:spPr>
+          <p:txBody>
+            <a:bodyPr wrap="none" rtlCol="0">
+              <a:spAutoFit/>
+            </a:bodyPr>
+            <a:lstStyle/>
+            <a:p>
+              <a:r>
+                <a:rPr lang="en-US" sz="1400" dirty="0" smtClean="0"/>
+                <a:t>relay</a:t>
+              </a:r>
+              <a:endParaRPr lang="en-US" sz="1400" dirty="0"/>
+            </a:p>
+          </p:txBody>
+        </p:sp>
+        <p:sp>
+          <p:nvSpPr>
+            <p:cNvPr id="83" name="TextBox 82"/>
+            <p:cNvSpPr txBox="1"/>
+            <p:nvPr/>
+          </p:nvSpPr>
+          <p:spPr>
+            <a:xfrm>
+              <a:off x="4649010" y="787490"/>
+              <a:ext cx="870688" cy="307777"/>
+            </a:xfrm>
+            <a:prstGeom prst="rect">
+              <a:avLst/>
+            </a:prstGeom>
+            <a:noFill/>
+          </p:spPr>
+          <p:txBody>
+            <a:bodyPr wrap="none" rtlCol="0">
+              <a:spAutoFit/>
+            </a:bodyPr>
+            <a:lstStyle/>
+            <a:p>
+              <a:r>
+                <a:rPr lang="en-US" sz="1400" dirty="0" smtClean="0"/>
+                <a:t>actuators</a:t>
+              </a:r>
+              <a:endParaRPr lang="en-US" sz="1400" dirty="0"/>
+            </a:p>
+          </p:txBody>
+        </p:sp>
+      </p:grpSp>
+      <p:grpSp>
+        <p:nvGrpSpPr>
+          <p:cNvPr id="8" name="Group 7"/>
+          <p:cNvGrpSpPr/>
+          <p:nvPr/>
+        </p:nvGrpSpPr>
+        <p:grpSpPr>
+          <a:xfrm>
+            <a:off x="3803165" y="83094"/>
+            <a:ext cx="1716533" cy="1012173"/>
+            <a:chOff x="3803165" y="83094"/>
+            <a:chExt cx="1716533" cy="1012173"/>
+          </a:xfrm>
+        </p:grpSpPr>
+        <p:pic>
+          <p:nvPicPr>
+            <p:cNvPr id="63" name="Picture 62"/>
+            <p:cNvPicPr>
+              <a:picLocks noChangeAspect="1"/>
+            </p:cNvPicPr>
+            <p:nvPr/>
+          </p:nvPicPr>
+          <p:blipFill>
+            <a:blip r:embed="rId3" cstate="print">
+              <a:extLst>
+                <a:ext uri="{28A0092B-C50C-407E-A947-70E740481C1C}">
+                  <a14:useLocalDpi xmlns:a14="http://schemas.microsoft.com/office/drawing/2010/main" val="0"/>
+                </a:ext>
+              </a:extLst>
+            </a:blip>
+            <a:stretch>
+              <a:fillRect/>
+            </a:stretch>
+          </p:blipFill>
+          <p:spPr>
+            <a:xfrm>
+              <a:off x="3803165" y="143982"/>
+              <a:ext cx="709744" cy="709744"/>
+            </a:xfrm>
+            <a:prstGeom prst="rect">
+              <a:avLst/>
+            </a:prstGeom>
+          </p:spPr>
+        </p:pic>
+        <p:cxnSp>
+          <p:nvCxnSpPr>
+            <p:cNvPr id="52" name="Straight Arrow Connector 51"/>
+            <p:cNvCxnSpPr/>
+            <p:nvPr/>
+          </p:nvCxnSpPr>
+          <p:spPr>
+            <a:xfrm flipV="1">
+              <a:off x="4361839" y="428779"/>
+              <a:ext cx="347772" cy="4342"/>
+            </a:xfrm>
+            <a:prstGeom prst="straightConnector1">
+              <a:avLst/>
+            </a:prstGeom>
+            <a:ln>
+              <a:tailEnd type="triangle"/>
+            </a:ln>
+          </p:spPr>
+          <p:style>
+            <a:lnRef idx="1">
+              <a:schemeClr val="accent1"/>
+            </a:lnRef>
+            <a:fillRef idx="0">
+              <a:schemeClr val="accent1"/>
+            </a:fillRef>
+            <a:effectRef idx="0">
+              <a:schemeClr val="accent1"/>
+            </a:effectRef>
+            <a:fontRef idx="minor">
+              <a:schemeClr val="tx1"/>
+            </a:fontRef>
+          </p:style>
+        </p:cxnSp>
+        <p:pic>
+          <p:nvPicPr>
+            <p:cNvPr id="55" name="Picture 54"/>
+            <p:cNvPicPr>
+              <a:picLocks noChangeAspect="1"/>
+            </p:cNvPicPr>
+            <p:nvPr/>
+          </p:nvPicPr>
+          <p:blipFill>
+            <a:blip r:embed="rId4">
+              <a:extLst>
+                <a:ext uri="{28A0092B-C50C-407E-A947-70E740481C1C}">
+                  <a14:useLocalDpi xmlns:a14="http://schemas.microsoft.com/office/drawing/2010/main" val="0"/>
+                </a:ext>
+              </a:extLst>
+            </a:blip>
+            <a:stretch>
+              <a:fillRect/>
+            </a:stretch>
+          </p:blipFill>
+          <p:spPr>
+            <a:xfrm>
+              <a:off x="4709611" y="83094"/>
+              <a:ext cx="709744" cy="709744"/>
+            </a:xfrm>
+            <a:prstGeom prst="rect">
+              <a:avLst/>
+            </a:prstGeom>
+          </p:spPr>
+        </p:pic>
+        <p:sp>
+          <p:nvSpPr>
+            <p:cNvPr id="57" name="TextBox 56"/>
+            <p:cNvSpPr txBox="1"/>
+            <p:nvPr/>
+          </p:nvSpPr>
+          <p:spPr>
+            <a:xfrm>
+              <a:off x="3939266" y="634354"/>
+              <a:ext cx="541238" cy="307777"/>
+            </a:xfrm>
+            <a:prstGeom prst="rect">
+              <a:avLst/>
+            </a:prstGeom>
+            <a:noFill/>
+          </p:spPr>
+          <p:txBody>
+            <a:bodyPr wrap="none" rtlCol="0">
+              <a:spAutoFit/>
+            </a:bodyPr>
+            <a:lstStyle/>
+            <a:p>
+              <a:r>
+                <a:rPr lang="en-US" sz="1400" dirty="0" smtClean="0"/>
+                <a:t>relay</a:t>
+              </a:r>
+              <a:endParaRPr lang="en-US" sz="1400" dirty="0"/>
+            </a:p>
+          </p:txBody>
+        </p:sp>
+        <p:sp>
+          <p:nvSpPr>
+            <p:cNvPr id="59" name="TextBox 58"/>
+            <p:cNvSpPr txBox="1"/>
+            <p:nvPr/>
+          </p:nvSpPr>
+          <p:spPr>
+            <a:xfrm>
+              <a:off x="4649010" y="787490"/>
+              <a:ext cx="870688" cy="307777"/>
+            </a:xfrm>
+            <a:prstGeom prst="rect">
+              <a:avLst/>
+            </a:prstGeom>
+            <a:noFill/>
+          </p:spPr>
+          <p:txBody>
+            <a:bodyPr wrap="none" rtlCol="0">
+              <a:spAutoFit/>
+            </a:bodyPr>
+            <a:lstStyle/>
+            <a:p>
+              <a:r>
+                <a:rPr lang="en-US" sz="1400" dirty="0" smtClean="0"/>
+                <a:t>actuators</a:t>
+              </a:r>
+              <a:endParaRPr lang="en-US" sz="1400" dirty="0"/>
+            </a:p>
+          </p:txBody>
+        </p:sp>
+      </p:grpSp>
       <p:pic>
         <p:nvPicPr>
           <p:cNvPr id="2" name="Picture 1"/>
@@ -5467,7 +5803,7 @@
           <p:nvPr/>
         </p:nvPicPr>
         <p:blipFill>
-          <a:blip r:embed="rId3">
+          <a:blip r:embed="rId5">
             <a:extLst>
               <a:ext uri="{28A0092B-C50C-407E-A947-70E740481C1C}">
                 <a14:useLocalDpi xmlns:a14="http://schemas.microsoft.com/office/drawing/2010/main" val="0"/>
@@ -5497,7 +5833,7 @@
           <p:nvPr/>
         </p:nvPicPr>
         <p:blipFill>
-          <a:blip r:embed="rId3">
+          <a:blip r:embed="rId5">
             <a:extLst>
               <a:ext uri="{28A0092B-C50C-407E-A947-70E740481C1C}">
                 <a14:useLocalDpi xmlns:a14="http://schemas.microsoft.com/office/drawing/2010/main" val="0"/>
@@ -5527,7 +5863,7 @@
           <p:nvPr/>
         </p:nvPicPr>
         <p:blipFill>
-          <a:blip r:embed="rId3">
+          <a:blip r:embed="rId5">
             <a:extLst>
               <a:ext uri="{28A0092B-C50C-407E-A947-70E740481C1C}">
                 <a14:useLocalDpi xmlns:a14="http://schemas.microsoft.com/office/drawing/2010/main" val="0"/>
@@ -5557,7 +5893,7 @@
           <p:nvPr/>
         </p:nvPicPr>
         <p:blipFill>
-          <a:blip r:embed="rId3">
+          <a:blip r:embed="rId5">
             <a:extLst>
               <a:ext uri="{28A0092B-C50C-407E-A947-70E740481C1C}">
                 <a14:useLocalDpi xmlns:a14="http://schemas.microsoft.com/office/drawing/2010/main" val="0"/>
@@ -5569,8 +5905,8 @@
           </a:stretch>
         </p:blipFill>
         <p:spPr>
-          <a:xfrm>
-            <a:off x="5030112" y="3387624"/>
+          <a:xfrm rot="955953">
+            <a:off x="5117215" y="3634939"/>
             <a:ext cx="2116818" cy="1360812"/>
           </a:xfrm>
           <a:prstGeom prst="rect">
@@ -5585,7 +5921,7 @@
           <p:nvPr/>
         </p:nvPicPr>
         <p:blipFill>
-          <a:blip r:embed="rId4">
+          <a:blip r:embed="rId6" cstate="print">
             <a:extLst>
               <a:ext uri="{28A0092B-C50C-407E-A947-70E740481C1C}">
                 <a14:useLocalDpi xmlns:a14="http://schemas.microsoft.com/office/drawing/2010/main" val="0"/>
@@ -5613,7 +5949,7 @@
           <p:nvPr/>
         </p:nvPicPr>
         <p:blipFill>
-          <a:blip r:embed="rId4">
+          <a:blip r:embed="rId6" cstate="print">
             <a:extLst>
               <a:ext uri="{28A0092B-C50C-407E-A947-70E740481C1C}">
                 <a14:useLocalDpi xmlns:a14="http://schemas.microsoft.com/office/drawing/2010/main" val="0"/>
@@ -5641,7 +5977,7 @@
           <p:nvPr/>
         </p:nvPicPr>
         <p:blipFill>
-          <a:blip r:embed="rId4">
+          <a:blip r:embed="rId6" cstate="print">
             <a:extLst>
               <a:ext uri="{28A0092B-C50C-407E-A947-70E740481C1C}">
                 <a14:useLocalDpi xmlns:a14="http://schemas.microsoft.com/office/drawing/2010/main" val="0"/>
@@ -5806,36 +6142,6 @@
           </a:p>
         </p:txBody>
       </p:sp>
-      <p:pic>
-        <p:nvPicPr>
-          <p:cNvPr id="20" name="Picture 19"/>
-          <p:cNvPicPr>
-            <a:picLocks noChangeAspect="1"/>
-          </p:cNvPicPr>
-          <p:nvPr/>
-        </p:nvPicPr>
-        <p:blipFill>
-          <a:blip r:embed="rId5">
-            <a:extLst>
-              <a:ext uri="{28A0092B-C50C-407E-A947-70E740481C1C}">
-                <a14:useLocalDpi xmlns:a14="http://schemas.microsoft.com/office/drawing/2010/main" val="0"/>
-              </a:ext>
-            </a:extLst>
-          </a:blip>
-          <a:stretch>
-            <a:fillRect/>
-          </a:stretch>
-        </p:blipFill>
-        <p:spPr>
-          <a:xfrm>
-            <a:off x="5320338" y="2370413"/>
-            <a:ext cx="1335218" cy="1000125"/>
-          </a:xfrm>
-          <a:prstGeom prst="rect">
-            <a:avLst/>
-          </a:prstGeom>
-        </p:spPr>
-      </p:pic>
       <p:sp>
         <p:nvSpPr>
           <p:cNvPr id="21" name="Oval 20"/>
@@ -5844,8 +6150,8 @@
         </p:nvSpPr>
         <p:spPr>
           <a:xfrm>
-            <a:off x="4979155" y="2419653"/>
-            <a:ext cx="2170946" cy="2345870"/>
+            <a:off x="4991792" y="2388503"/>
+            <a:ext cx="2388358" cy="2580800"/>
           </a:xfrm>
           <a:prstGeom prst="ellipse">
             <a:avLst/>
@@ -5893,7 +6199,7 @@
           <p:nvPr/>
         </p:nvPicPr>
         <p:blipFill>
-          <a:blip r:embed="rId6">
+          <a:blip r:embed="rId7" cstate="print">
             <a:extLst>
               <a:ext uri="{28A0092B-C50C-407E-A947-70E740481C1C}">
                 <a14:useLocalDpi xmlns:a14="http://schemas.microsoft.com/office/drawing/2010/main" val="0"/>
@@ -5917,507 +6223,6 @@
       <p:pic>
         <p:nvPicPr>
           <p:cNvPr id="23" name="Picture 22"/>
-          <p:cNvPicPr>
-            <a:picLocks noChangeAspect="1"/>
-          </p:cNvPicPr>
-          <p:nvPr/>
-        </p:nvPicPr>
-        <p:blipFill>
-          <a:blip r:embed="rId7">
-            <a:extLst>
-              <a:ext uri="{28A0092B-C50C-407E-A947-70E740481C1C}">
-                <a14:useLocalDpi xmlns:a14="http://schemas.microsoft.com/office/drawing/2010/main" val="0"/>
-              </a:ext>
-            </a:extLst>
-          </a:blip>
-          <a:stretch>
-            <a:fillRect/>
-          </a:stretch>
-        </p:blipFill>
-        <p:spPr>
-          <a:xfrm>
-            <a:off x="9339888" y="4548630"/>
-            <a:ext cx="2626011" cy="1790462"/>
-          </a:xfrm>
-          <a:prstGeom prst="rect">
-            <a:avLst/>
-          </a:prstGeom>
-        </p:spPr>
-      </p:pic>
-      <p:cxnSp>
-        <p:nvCxnSpPr>
-          <p:cNvPr id="25" name="Straight Arrow Connector 24"/>
-          <p:cNvCxnSpPr/>
-          <p:nvPr/>
-        </p:nvCxnSpPr>
-        <p:spPr>
-          <a:xfrm>
-            <a:off x="4070628" y="1596571"/>
-            <a:ext cx="959484" cy="823082"/>
-          </a:xfrm>
-          <a:prstGeom prst="straightConnector1">
-            <a:avLst/>
-          </a:prstGeom>
-          <a:ln>
-            <a:headEnd type="triangle"/>
-            <a:tailEnd type="triangle"/>
-          </a:ln>
-        </p:spPr>
-        <p:style>
-          <a:lnRef idx="1">
-            <a:schemeClr val="accent1"/>
-          </a:lnRef>
-          <a:fillRef idx="0">
-            <a:schemeClr val="accent1"/>
-          </a:fillRef>
-          <a:effectRef idx="0">
-            <a:schemeClr val="accent1"/>
-          </a:effectRef>
-          <a:fontRef idx="minor">
-            <a:schemeClr val="tx1"/>
-          </a:fontRef>
-        </p:style>
-      </p:cxnSp>
-      <p:cxnSp>
-        <p:nvCxnSpPr>
-          <p:cNvPr id="27" name="Straight Arrow Connector 26"/>
-          <p:cNvCxnSpPr/>
-          <p:nvPr/>
-        </p:nvCxnSpPr>
-        <p:spPr>
-          <a:xfrm>
-            <a:off x="4192562" y="3370538"/>
-            <a:ext cx="640695" cy="0"/>
-          </a:xfrm>
-          <a:prstGeom prst="straightConnector1">
-            <a:avLst/>
-          </a:prstGeom>
-          <a:ln>
-            <a:headEnd type="triangle"/>
-            <a:tailEnd type="triangle"/>
-          </a:ln>
-        </p:spPr>
-        <p:style>
-          <a:lnRef idx="1">
-            <a:schemeClr val="accent1"/>
-          </a:lnRef>
-          <a:fillRef idx="0">
-            <a:schemeClr val="accent1"/>
-          </a:fillRef>
-          <a:effectRef idx="0">
-            <a:schemeClr val="accent1"/>
-          </a:effectRef>
-          <a:fontRef idx="minor">
-            <a:schemeClr val="tx1"/>
-          </a:fontRef>
-        </p:style>
-      </p:cxnSp>
-      <p:cxnSp>
-        <p:nvCxnSpPr>
-          <p:cNvPr id="29" name="Straight Arrow Connector 28"/>
-          <p:cNvCxnSpPr/>
-          <p:nvPr/>
-        </p:nvCxnSpPr>
-        <p:spPr>
-          <a:xfrm flipV="1">
-            <a:off x="4288497" y="4686339"/>
-            <a:ext cx="1031841" cy="632460"/>
-          </a:xfrm>
-          <a:prstGeom prst="straightConnector1">
-            <a:avLst/>
-          </a:prstGeom>
-          <a:ln>
-            <a:headEnd type="triangle"/>
-            <a:tailEnd type="triangle"/>
-          </a:ln>
-        </p:spPr>
-        <p:style>
-          <a:lnRef idx="1">
-            <a:schemeClr val="accent1"/>
-          </a:lnRef>
-          <a:fillRef idx="0">
-            <a:schemeClr val="accent1"/>
-          </a:fillRef>
-          <a:effectRef idx="0">
-            <a:schemeClr val="accent1"/>
-          </a:effectRef>
-          <a:fontRef idx="minor">
-            <a:schemeClr val="tx1"/>
-          </a:fontRef>
-        </p:style>
-      </p:cxnSp>
-      <p:cxnSp>
-        <p:nvCxnSpPr>
-          <p:cNvPr id="31" name="Straight Arrow Connector 30"/>
-          <p:cNvCxnSpPr/>
-          <p:nvPr/>
-        </p:nvCxnSpPr>
-        <p:spPr>
-          <a:xfrm>
-            <a:off x="1953811" y="695235"/>
-            <a:ext cx="441500" cy="233318"/>
-          </a:xfrm>
-          <a:prstGeom prst="straightConnector1">
-            <a:avLst/>
-          </a:prstGeom>
-          <a:ln>
-            <a:tailEnd type="triangle"/>
-          </a:ln>
-        </p:spPr>
-        <p:style>
-          <a:lnRef idx="1">
-            <a:schemeClr val="accent1"/>
-          </a:lnRef>
-          <a:fillRef idx="0">
-            <a:schemeClr val="accent1"/>
-          </a:fillRef>
-          <a:effectRef idx="0">
-            <a:schemeClr val="accent1"/>
-          </a:effectRef>
-          <a:fontRef idx="minor">
-            <a:schemeClr val="tx1"/>
-          </a:fontRef>
-        </p:style>
-      </p:cxnSp>
-      <p:cxnSp>
-        <p:nvCxnSpPr>
-          <p:cNvPr id="33" name="Straight Arrow Connector 32"/>
-          <p:cNvCxnSpPr/>
-          <p:nvPr/>
-        </p:nvCxnSpPr>
-        <p:spPr>
-          <a:xfrm>
-            <a:off x="1352888" y="928553"/>
-            <a:ext cx="593125" cy="285814"/>
-          </a:xfrm>
-          <a:prstGeom prst="straightConnector1">
-            <a:avLst/>
-          </a:prstGeom>
-          <a:ln>
-            <a:tailEnd type="triangle"/>
-          </a:ln>
-        </p:spPr>
-        <p:style>
-          <a:lnRef idx="1">
-            <a:schemeClr val="accent1"/>
-          </a:lnRef>
-          <a:fillRef idx="0">
-            <a:schemeClr val="accent1"/>
-          </a:fillRef>
-          <a:effectRef idx="0">
-            <a:schemeClr val="accent1"/>
-          </a:effectRef>
-          <a:fontRef idx="minor">
-            <a:schemeClr val="tx1"/>
-          </a:fontRef>
-        </p:style>
-      </p:cxnSp>
-      <p:cxnSp>
-        <p:nvCxnSpPr>
-          <p:cNvPr id="35" name="Straight Arrow Connector 34"/>
-          <p:cNvCxnSpPr>
-            <a:stCxn id="14" idx="3"/>
-          </p:cNvCxnSpPr>
-          <p:nvPr/>
-        </p:nvCxnSpPr>
-        <p:spPr>
-          <a:xfrm flipV="1">
-            <a:off x="1284383" y="1407886"/>
-            <a:ext cx="661630" cy="124276"/>
-          </a:xfrm>
-          <a:prstGeom prst="straightConnector1">
-            <a:avLst/>
-          </a:prstGeom>
-          <a:ln>
-            <a:tailEnd type="triangle"/>
-          </a:ln>
-        </p:spPr>
-        <p:style>
-          <a:lnRef idx="1">
-            <a:schemeClr val="accent1"/>
-          </a:lnRef>
-          <a:fillRef idx="0">
-            <a:schemeClr val="accent1"/>
-          </a:fillRef>
-          <a:effectRef idx="0">
-            <a:schemeClr val="accent1"/>
-          </a:effectRef>
-          <a:fontRef idx="minor">
-            <a:schemeClr val="tx1"/>
-          </a:fontRef>
-        </p:style>
-      </p:cxnSp>
-      <p:cxnSp>
-        <p:nvCxnSpPr>
-          <p:cNvPr id="37" name="Straight Arrow Connector 36"/>
-          <p:cNvCxnSpPr/>
-          <p:nvPr/>
-        </p:nvCxnSpPr>
-        <p:spPr>
-          <a:xfrm flipV="1">
-            <a:off x="2121689" y="1596571"/>
-            <a:ext cx="273622" cy="181381"/>
-          </a:xfrm>
-          <a:prstGeom prst="straightConnector1">
-            <a:avLst/>
-          </a:prstGeom>
-          <a:ln>
-            <a:tailEnd type="triangle"/>
-          </a:ln>
-        </p:spPr>
-        <p:style>
-          <a:lnRef idx="1">
-            <a:schemeClr val="accent1"/>
-          </a:lnRef>
-          <a:fillRef idx="0">
-            <a:schemeClr val="accent1"/>
-          </a:fillRef>
-          <a:effectRef idx="0">
-            <a:schemeClr val="accent1"/>
-          </a:effectRef>
-          <a:fontRef idx="minor">
-            <a:schemeClr val="tx1"/>
-          </a:fontRef>
-        </p:style>
-      </p:cxnSp>
-      <p:cxnSp>
-        <p:nvCxnSpPr>
-          <p:cNvPr id="39" name="Straight Arrow Connector 38"/>
-          <p:cNvCxnSpPr/>
-          <p:nvPr/>
-        </p:nvCxnSpPr>
-        <p:spPr>
-          <a:xfrm>
-            <a:off x="1602342" y="2755858"/>
-            <a:ext cx="605525" cy="413794"/>
-          </a:xfrm>
-          <a:prstGeom prst="straightConnector1">
-            <a:avLst/>
-          </a:prstGeom>
-          <a:ln>
-            <a:tailEnd type="triangle"/>
-          </a:ln>
-        </p:spPr>
-        <p:style>
-          <a:lnRef idx="1">
-            <a:schemeClr val="accent1"/>
-          </a:lnRef>
-          <a:fillRef idx="0">
-            <a:schemeClr val="accent1"/>
-          </a:fillRef>
-          <a:effectRef idx="0">
-            <a:schemeClr val="accent1"/>
-          </a:effectRef>
-          <a:fontRef idx="minor">
-            <a:schemeClr val="tx1"/>
-          </a:fontRef>
-        </p:style>
-      </p:cxnSp>
-      <p:cxnSp>
-        <p:nvCxnSpPr>
-          <p:cNvPr id="41" name="Straight Arrow Connector 40"/>
-          <p:cNvCxnSpPr>
-            <a:stCxn id="11" idx="3"/>
-            <a:endCxn id="4" idx="1"/>
-          </p:cNvCxnSpPr>
-          <p:nvPr/>
-        </p:nvCxnSpPr>
-        <p:spPr>
-          <a:xfrm>
-            <a:off x="1016703" y="3399859"/>
-            <a:ext cx="937107" cy="7532"/>
-          </a:xfrm>
-          <a:prstGeom prst="straightConnector1">
-            <a:avLst/>
-          </a:prstGeom>
-          <a:ln>
-            <a:tailEnd type="triangle"/>
-          </a:ln>
-        </p:spPr>
-        <p:style>
-          <a:lnRef idx="1">
-            <a:schemeClr val="accent1"/>
-          </a:lnRef>
-          <a:fillRef idx="0">
-            <a:schemeClr val="accent1"/>
-          </a:fillRef>
-          <a:effectRef idx="0">
-            <a:schemeClr val="accent1"/>
-          </a:effectRef>
-          <a:fontRef idx="minor">
-            <a:schemeClr val="tx1"/>
-          </a:fontRef>
-        </p:style>
-      </p:cxnSp>
-      <p:cxnSp>
-        <p:nvCxnSpPr>
-          <p:cNvPr id="43" name="Straight Arrow Connector 42"/>
-          <p:cNvCxnSpPr/>
-          <p:nvPr/>
-        </p:nvCxnSpPr>
-        <p:spPr>
-          <a:xfrm flipV="1">
-            <a:off x="1824629" y="3717653"/>
-            <a:ext cx="347050" cy="258225"/>
-          </a:xfrm>
-          <a:prstGeom prst="straightConnector1">
-            <a:avLst/>
-          </a:prstGeom>
-          <a:ln>
-            <a:tailEnd type="triangle"/>
-          </a:ln>
-        </p:spPr>
-        <p:style>
-          <a:lnRef idx="1">
-            <a:schemeClr val="accent1"/>
-          </a:lnRef>
-          <a:fillRef idx="0">
-            <a:schemeClr val="accent1"/>
-          </a:fillRef>
-          <a:effectRef idx="0">
-            <a:schemeClr val="accent1"/>
-          </a:effectRef>
-          <a:fontRef idx="minor">
-            <a:schemeClr val="tx1"/>
-          </a:fontRef>
-        </p:style>
-      </p:cxnSp>
-      <p:cxnSp>
-        <p:nvCxnSpPr>
-          <p:cNvPr id="45" name="Straight Arrow Connector 44"/>
-          <p:cNvCxnSpPr/>
-          <p:nvPr/>
-        </p:nvCxnSpPr>
-        <p:spPr>
-          <a:xfrm>
-            <a:off x="2121689" y="5181600"/>
-            <a:ext cx="418311" cy="333829"/>
-          </a:xfrm>
-          <a:prstGeom prst="straightConnector1">
-            <a:avLst/>
-          </a:prstGeom>
-          <a:ln>
-            <a:tailEnd type="triangle"/>
-          </a:ln>
-        </p:spPr>
-        <p:style>
-          <a:lnRef idx="1">
-            <a:schemeClr val="accent1"/>
-          </a:lnRef>
-          <a:fillRef idx="0">
-            <a:schemeClr val="accent1"/>
-          </a:fillRef>
-          <a:effectRef idx="0">
-            <a:schemeClr val="accent1"/>
-          </a:effectRef>
-          <a:fontRef idx="minor">
-            <a:schemeClr val="tx1"/>
-          </a:fontRef>
-        </p:style>
-      </p:cxnSp>
-      <p:cxnSp>
-        <p:nvCxnSpPr>
-          <p:cNvPr id="47" name="Straight Arrow Connector 46"/>
-          <p:cNvCxnSpPr/>
-          <p:nvPr/>
-        </p:nvCxnSpPr>
-        <p:spPr>
-          <a:xfrm>
-            <a:off x="1512310" y="5776686"/>
-            <a:ext cx="659369" cy="43543"/>
-          </a:xfrm>
-          <a:prstGeom prst="straightConnector1">
-            <a:avLst/>
-          </a:prstGeom>
-          <a:ln>
-            <a:tailEnd type="triangle"/>
-          </a:ln>
-        </p:spPr>
-        <p:style>
-          <a:lnRef idx="1">
-            <a:schemeClr val="accent1"/>
-          </a:lnRef>
-          <a:fillRef idx="0">
-            <a:schemeClr val="accent1"/>
-          </a:fillRef>
-          <a:effectRef idx="0">
-            <a:schemeClr val="accent1"/>
-          </a:effectRef>
-          <a:fontRef idx="minor">
-            <a:schemeClr val="tx1"/>
-          </a:fontRef>
-        </p:style>
-      </p:cxnSp>
-      <p:cxnSp>
-        <p:nvCxnSpPr>
-          <p:cNvPr id="49" name="Straight Arrow Connector 48"/>
-          <p:cNvCxnSpPr/>
-          <p:nvPr/>
-        </p:nvCxnSpPr>
-        <p:spPr>
-          <a:xfrm flipV="1">
-            <a:off x="1992015" y="6041979"/>
-            <a:ext cx="547985" cy="297113"/>
-          </a:xfrm>
-          <a:prstGeom prst="straightConnector1">
-            <a:avLst/>
-          </a:prstGeom>
-          <a:ln>
-            <a:tailEnd type="triangle"/>
-          </a:ln>
-        </p:spPr>
-        <p:style>
-          <a:lnRef idx="1">
-            <a:schemeClr val="accent1"/>
-          </a:lnRef>
-          <a:fillRef idx="0">
-            <a:schemeClr val="accent1"/>
-          </a:fillRef>
-          <a:effectRef idx="0">
-            <a:schemeClr val="accent1"/>
-          </a:effectRef>
-          <a:fontRef idx="minor">
-            <a:schemeClr val="tx1"/>
-          </a:fontRef>
-        </p:style>
-      </p:cxnSp>
-      <p:cxnSp>
-        <p:nvCxnSpPr>
-          <p:cNvPr id="53" name="Straight Arrow Connector 52"/>
-          <p:cNvCxnSpPr/>
-          <p:nvPr/>
-        </p:nvCxnSpPr>
-        <p:spPr>
-          <a:xfrm>
-            <a:off x="9559128" y="3308049"/>
-            <a:ext cx="624115" cy="1102184"/>
-          </a:xfrm>
-          <a:prstGeom prst="straightConnector1">
-            <a:avLst/>
-          </a:prstGeom>
-          <a:ln>
-            <a:headEnd type="triangle"/>
-            <a:tailEnd type="triangle"/>
-          </a:ln>
-        </p:spPr>
-        <p:style>
-          <a:lnRef idx="1">
-            <a:schemeClr val="accent1"/>
-          </a:lnRef>
-          <a:fillRef idx="0">
-            <a:schemeClr val="accent1"/>
-          </a:fillRef>
-          <a:effectRef idx="0">
-            <a:schemeClr val="accent1"/>
-          </a:effectRef>
-          <a:fontRef idx="minor">
-            <a:schemeClr val="tx1"/>
-          </a:fontRef>
-        </p:style>
-      </p:cxnSp>
-      <p:pic>
-        <p:nvPicPr>
-          <p:cNvPr id="54" name="Picture 53"/>
           <p:cNvPicPr>
             <a:picLocks noChangeAspect="1"/>
           </p:cNvPicPr>
@@ -6437,17 +6242,490 @@
         </p:blipFill>
         <p:spPr>
           <a:xfrm>
-            <a:off x="5979796" y="717621"/>
-            <a:ext cx="1351520" cy="977804"/>
+            <a:off x="9339888" y="4548630"/>
+            <a:ext cx="2626011" cy="1790462"/>
           </a:xfrm>
           <a:prstGeom prst="rect">
             <a:avLst/>
           </a:prstGeom>
         </p:spPr>
       </p:pic>
+      <p:cxnSp>
+        <p:nvCxnSpPr>
+          <p:cNvPr id="25" name="Straight Arrow Connector 24"/>
+          <p:cNvCxnSpPr>
+            <a:stCxn id="3" idx="3"/>
+          </p:cNvCxnSpPr>
+          <p:nvPr/>
+        </p:nvCxnSpPr>
+        <p:spPr>
+          <a:xfrm>
+            <a:off x="3941447" y="1250262"/>
+            <a:ext cx="1817155" cy="1226791"/>
+          </a:xfrm>
+          <a:prstGeom prst="straightConnector1">
+            <a:avLst/>
+          </a:prstGeom>
+          <a:ln>
+            <a:headEnd type="triangle"/>
+            <a:tailEnd type="triangle"/>
+          </a:ln>
+        </p:spPr>
+        <p:style>
+          <a:lnRef idx="1">
+            <a:schemeClr val="accent1"/>
+          </a:lnRef>
+          <a:fillRef idx="0">
+            <a:schemeClr val="accent1"/>
+          </a:fillRef>
+          <a:effectRef idx="0">
+            <a:schemeClr val="accent1"/>
+          </a:effectRef>
+          <a:fontRef idx="minor">
+            <a:schemeClr val="tx1"/>
+          </a:fontRef>
+        </p:style>
+      </p:cxnSp>
+      <p:cxnSp>
+        <p:nvCxnSpPr>
+          <p:cNvPr id="27" name="Straight Arrow Connector 26"/>
+          <p:cNvCxnSpPr/>
+          <p:nvPr/>
+        </p:nvCxnSpPr>
+        <p:spPr>
+          <a:xfrm>
+            <a:off x="4192562" y="3370538"/>
+            <a:ext cx="640695" cy="0"/>
+          </a:xfrm>
+          <a:prstGeom prst="straightConnector1">
+            <a:avLst/>
+          </a:prstGeom>
+          <a:ln>
+            <a:headEnd type="triangle"/>
+            <a:tailEnd type="triangle"/>
+          </a:ln>
+        </p:spPr>
+        <p:style>
+          <a:lnRef idx="1">
+            <a:schemeClr val="accent1"/>
+          </a:lnRef>
+          <a:fillRef idx="0">
+            <a:schemeClr val="accent1"/>
+          </a:fillRef>
+          <a:effectRef idx="0">
+            <a:schemeClr val="accent1"/>
+          </a:effectRef>
+          <a:fontRef idx="minor">
+            <a:schemeClr val="tx1"/>
+          </a:fontRef>
+        </p:style>
+      </p:cxnSp>
+      <p:cxnSp>
+        <p:nvCxnSpPr>
+          <p:cNvPr id="29" name="Straight Arrow Connector 28"/>
+          <p:cNvCxnSpPr/>
+          <p:nvPr/>
+        </p:nvCxnSpPr>
+        <p:spPr>
+          <a:xfrm flipV="1">
+            <a:off x="4288497" y="4686339"/>
+            <a:ext cx="1031841" cy="632460"/>
+          </a:xfrm>
+          <a:prstGeom prst="straightConnector1">
+            <a:avLst/>
+          </a:prstGeom>
+          <a:ln>
+            <a:headEnd type="triangle"/>
+            <a:tailEnd type="triangle"/>
+          </a:ln>
+        </p:spPr>
+        <p:style>
+          <a:lnRef idx="1">
+            <a:schemeClr val="accent1"/>
+          </a:lnRef>
+          <a:fillRef idx="0">
+            <a:schemeClr val="accent1"/>
+          </a:fillRef>
+          <a:effectRef idx="0">
+            <a:schemeClr val="accent1"/>
+          </a:effectRef>
+          <a:fontRef idx="minor">
+            <a:schemeClr val="tx1"/>
+          </a:fontRef>
+        </p:style>
+      </p:cxnSp>
+      <p:cxnSp>
+        <p:nvCxnSpPr>
+          <p:cNvPr id="31" name="Straight Arrow Connector 30"/>
+          <p:cNvCxnSpPr/>
+          <p:nvPr/>
+        </p:nvCxnSpPr>
+        <p:spPr>
+          <a:xfrm>
+            <a:off x="1953811" y="695235"/>
+            <a:ext cx="441500" cy="233318"/>
+          </a:xfrm>
+          <a:prstGeom prst="straightConnector1">
+            <a:avLst/>
+          </a:prstGeom>
+          <a:ln>
+            <a:tailEnd type="triangle"/>
+          </a:ln>
+        </p:spPr>
+        <p:style>
+          <a:lnRef idx="1">
+            <a:schemeClr val="accent1"/>
+          </a:lnRef>
+          <a:fillRef idx="0">
+            <a:schemeClr val="accent1"/>
+          </a:fillRef>
+          <a:effectRef idx="0">
+            <a:schemeClr val="accent1"/>
+          </a:effectRef>
+          <a:fontRef idx="minor">
+            <a:schemeClr val="tx1"/>
+          </a:fontRef>
+        </p:style>
+      </p:cxnSp>
+      <p:cxnSp>
+        <p:nvCxnSpPr>
+          <p:cNvPr id="33" name="Straight Arrow Connector 32"/>
+          <p:cNvCxnSpPr/>
+          <p:nvPr/>
+        </p:nvCxnSpPr>
+        <p:spPr>
+          <a:xfrm>
+            <a:off x="1352888" y="928553"/>
+            <a:ext cx="593125" cy="285814"/>
+          </a:xfrm>
+          <a:prstGeom prst="straightConnector1">
+            <a:avLst/>
+          </a:prstGeom>
+          <a:ln>
+            <a:tailEnd type="triangle"/>
+          </a:ln>
+        </p:spPr>
+        <p:style>
+          <a:lnRef idx="1">
+            <a:schemeClr val="accent1"/>
+          </a:lnRef>
+          <a:fillRef idx="0">
+            <a:schemeClr val="accent1"/>
+          </a:fillRef>
+          <a:effectRef idx="0">
+            <a:schemeClr val="accent1"/>
+          </a:effectRef>
+          <a:fontRef idx="minor">
+            <a:schemeClr val="tx1"/>
+          </a:fontRef>
+        </p:style>
+      </p:cxnSp>
+      <p:cxnSp>
+        <p:nvCxnSpPr>
+          <p:cNvPr id="35" name="Straight Arrow Connector 34"/>
+          <p:cNvCxnSpPr>
+            <a:stCxn id="14" idx="3"/>
+          </p:cNvCxnSpPr>
+          <p:nvPr/>
+        </p:nvCxnSpPr>
+        <p:spPr>
+          <a:xfrm flipV="1">
+            <a:off x="1284383" y="1407886"/>
+            <a:ext cx="661630" cy="124276"/>
+          </a:xfrm>
+          <a:prstGeom prst="straightConnector1">
+            <a:avLst/>
+          </a:prstGeom>
+          <a:ln>
+            <a:tailEnd type="triangle"/>
+          </a:ln>
+        </p:spPr>
+        <p:style>
+          <a:lnRef idx="1">
+            <a:schemeClr val="accent1"/>
+          </a:lnRef>
+          <a:fillRef idx="0">
+            <a:schemeClr val="accent1"/>
+          </a:fillRef>
+          <a:effectRef idx="0">
+            <a:schemeClr val="accent1"/>
+          </a:effectRef>
+          <a:fontRef idx="minor">
+            <a:schemeClr val="tx1"/>
+          </a:fontRef>
+        </p:style>
+      </p:cxnSp>
+      <p:cxnSp>
+        <p:nvCxnSpPr>
+          <p:cNvPr id="37" name="Straight Arrow Connector 36"/>
+          <p:cNvCxnSpPr/>
+          <p:nvPr/>
+        </p:nvCxnSpPr>
+        <p:spPr>
+          <a:xfrm flipV="1">
+            <a:off x="2121689" y="1596571"/>
+            <a:ext cx="273622" cy="181381"/>
+          </a:xfrm>
+          <a:prstGeom prst="straightConnector1">
+            <a:avLst/>
+          </a:prstGeom>
+          <a:ln>
+            <a:tailEnd type="triangle"/>
+          </a:ln>
+        </p:spPr>
+        <p:style>
+          <a:lnRef idx="1">
+            <a:schemeClr val="accent1"/>
+          </a:lnRef>
+          <a:fillRef idx="0">
+            <a:schemeClr val="accent1"/>
+          </a:fillRef>
+          <a:effectRef idx="0">
+            <a:schemeClr val="accent1"/>
+          </a:effectRef>
+          <a:fontRef idx="minor">
+            <a:schemeClr val="tx1"/>
+          </a:fontRef>
+        </p:style>
+      </p:cxnSp>
+      <p:cxnSp>
+        <p:nvCxnSpPr>
+          <p:cNvPr id="39" name="Straight Arrow Connector 38"/>
+          <p:cNvCxnSpPr/>
+          <p:nvPr/>
+        </p:nvCxnSpPr>
+        <p:spPr>
+          <a:xfrm>
+            <a:off x="1602342" y="2755858"/>
+            <a:ext cx="605525" cy="413794"/>
+          </a:xfrm>
+          <a:prstGeom prst="straightConnector1">
+            <a:avLst/>
+          </a:prstGeom>
+          <a:ln>
+            <a:tailEnd type="triangle"/>
+          </a:ln>
+        </p:spPr>
+        <p:style>
+          <a:lnRef idx="1">
+            <a:schemeClr val="accent1"/>
+          </a:lnRef>
+          <a:fillRef idx="0">
+            <a:schemeClr val="accent1"/>
+          </a:fillRef>
+          <a:effectRef idx="0">
+            <a:schemeClr val="accent1"/>
+          </a:effectRef>
+          <a:fontRef idx="minor">
+            <a:schemeClr val="tx1"/>
+          </a:fontRef>
+        </p:style>
+      </p:cxnSp>
+      <p:cxnSp>
+        <p:nvCxnSpPr>
+          <p:cNvPr id="41" name="Straight Arrow Connector 40"/>
+          <p:cNvCxnSpPr>
+            <a:stCxn id="11" idx="3"/>
+            <a:endCxn id="4" idx="1"/>
+          </p:cNvCxnSpPr>
+          <p:nvPr/>
+        </p:nvCxnSpPr>
+        <p:spPr>
+          <a:xfrm>
+            <a:off x="1016703" y="3399859"/>
+            <a:ext cx="937107" cy="7532"/>
+          </a:xfrm>
+          <a:prstGeom prst="straightConnector1">
+            <a:avLst/>
+          </a:prstGeom>
+          <a:ln>
+            <a:tailEnd type="triangle"/>
+          </a:ln>
+        </p:spPr>
+        <p:style>
+          <a:lnRef idx="1">
+            <a:schemeClr val="accent1"/>
+          </a:lnRef>
+          <a:fillRef idx="0">
+            <a:schemeClr val="accent1"/>
+          </a:fillRef>
+          <a:effectRef idx="0">
+            <a:schemeClr val="accent1"/>
+          </a:effectRef>
+          <a:fontRef idx="minor">
+            <a:schemeClr val="tx1"/>
+          </a:fontRef>
+        </p:style>
+      </p:cxnSp>
+      <p:cxnSp>
+        <p:nvCxnSpPr>
+          <p:cNvPr id="43" name="Straight Arrow Connector 42"/>
+          <p:cNvCxnSpPr/>
+          <p:nvPr/>
+        </p:nvCxnSpPr>
+        <p:spPr>
+          <a:xfrm flipV="1">
+            <a:off x="1824629" y="3717653"/>
+            <a:ext cx="347050" cy="258225"/>
+          </a:xfrm>
+          <a:prstGeom prst="straightConnector1">
+            <a:avLst/>
+          </a:prstGeom>
+          <a:ln>
+            <a:tailEnd type="triangle"/>
+          </a:ln>
+        </p:spPr>
+        <p:style>
+          <a:lnRef idx="1">
+            <a:schemeClr val="accent1"/>
+          </a:lnRef>
+          <a:fillRef idx="0">
+            <a:schemeClr val="accent1"/>
+          </a:fillRef>
+          <a:effectRef idx="0">
+            <a:schemeClr val="accent1"/>
+          </a:effectRef>
+          <a:fontRef idx="minor">
+            <a:schemeClr val="tx1"/>
+          </a:fontRef>
+        </p:style>
+      </p:cxnSp>
+      <p:cxnSp>
+        <p:nvCxnSpPr>
+          <p:cNvPr id="45" name="Straight Arrow Connector 44"/>
+          <p:cNvCxnSpPr/>
+          <p:nvPr/>
+        </p:nvCxnSpPr>
+        <p:spPr>
+          <a:xfrm>
+            <a:off x="2121689" y="5181600"/>
+            <a:ext cx="418311" cy="333829"/>
+          </a:xfrm>
+          <a:prstGeom prst="straightConnector1">
+            <a:avLst/>
+          </a:prstGeom>
+          <a:ln>
+            <a:tailEnd type="triangle"/>
+          </a:ln>
+        </p:spPr>
+        <p:style>
+          <a:lnRef idx="1">
+            <a:schemeClr val="accent1"/>
+          </a:lnRef>
+          <a:fillRef idx="0">
+            <a:schemeClr val="accent1"/>
+          </a:fillRef>
+          <a:effectRef idx="0">
+            <a:schemeClr val="accent1"/>
+          </a:effectRef>
+          <a:fontRef idx="minor">
+            <a:schemeClr val="tx1"/>
+          </a:fontRef>
+        </p:style>
+      </p:cxnSp>
+      <p:cxnSp>
+        <p:nvCxnSpPr>
+          <p:cNvPr id="47" name="Straight Arrow Connector 46"/>
+          <p:cNvCxnSpPr/>
+          <p:nvPr/>
+        </p:nvCxnSpPr>
+        <p:spPr>
+          <a:xfrm>
+            <a:off x="1512310" y="5776686"/>
+            <a:ext cx="659369" cy="43543"/>
+          </a:xfrm>
+          <a:prstGeom prst="straightConnector1">
+            <a:avLst/>
+          </a:prstGeom>
+          <a:ln>
+            <a:tailEnd type="triangle"/>
+          </a:ln>
+        </p:spPr>
+        <p:style>
+          <a:lnRef idx="1">
+            <a:schemeClr val="accent1"/>
+          </a:lnRef>
+          <a:fillRef idx="0">
+            <a:schemeClr val="accent1"/>
+          </a:fillRef>
+          <a:effectRef idx="0">
+            <a:schemeClr val="accent1"/>
+          </a:effectRef>
+          <a:fontRef idx="minor">
+            <a:schemeClr val="tx1"/>
+          </a:fontRef>
+        </p:style>
+      </p:cxnSp>
+      <p:cxnSp>
+        <p:nvCxnSpPr>
+          <p:cNvPr id="49" name="Straight Arrow Connector 48"/>
+          <p:cNvCxnSpPr/>
+          <p:nvPr/>
+        </p:nvCxnSpPr>
+        <p:spPr>
+          <a:xfrm flipV="1">
+            <a:off x="1992015" y="6041979"/>
+            <a:ext cx="547985" cy="297113"/>
+          </a:xfrm>
+          <a:prstGeom prst="straightConnector1">
+            <a:avLst/>
+          </a:prstGeom>
+          <a:ln>
+            <a:tailEnd type="triangle"/>
+          </a:ln>
+        </p:spPr>
+        <p:style>
+          <a:lnRef idx="1">
+            <a:schemeClr val="accent1"/>
+          </a:lnRef>
+          <a:fillRef idx="0">
+            <a:schemeClr val="accent1"/>
+          </a:fillRef>
+          <a:effectRef idx="0">
+            <a:schemeClr val="accent1"/>
+          </a:effectRef>
+          <a:fontRef idx="minor">
+            <a:schemeClr val="tx1"/>
+          </a:fontRef>
+        </p:style>
+      </p:cxnSp>
+      <p:cxnSp>
+        <p:nvCxnSpPr>
+          <p:cNvPr id="53" name="Straight Arrow Connector 52"/>
+          <p:cNvCxnSpPr/>
+          <p:nvPr/>
+        </p:nvCxnSpPr>
+        <p:spPr>
+          <a:xfrm>
+            <a:off x="9559128" y="3308049"/>
+            <a:ext cx="624115" cy="1102184"/>
+          </a:xfrm>
+          <a:prstGeom prst="straightConnector1">
+            <a:avLst/>
+          </a:prstGeom>
+          <a:ln>
+            <a:headEnd type="triangle"/>
+            <a:tailEnd type="triangle"/>
+          </a:ln>
+        </p:spPr>
+        <p:style>
+          <a:lnRef idx="1">
+            <a:schemeClr val="accent1"/>
+          </a:lnRef>
+          <a:fillRef idx="0">
+            <a:schemeClr val="accent1"/>
+          </a:fillRef>
+          <a:effectRef idx="0">
+            <a:schemeClr val="accent1"/>
+          </a:effectRef>
+          <a:fontRef idx="minor">
+            <a:schemeClr val="tx1"/>
+          </a:fontRef>
+        </p:style>
+      </p:cxnSp>
       <p:pic>
         <p:nvPicPr>
-          <p:cNvPr id="56" name="Picture 55"/>
+          <p:cNvPr id="54" name="Picture 53"/>
           <p:cNvPicPr>
             <a:picLocks noChangeAspect="1"/>
           </p:cNvPicPr>
@@ -6467,6 +6745,36 @@
         </p:blipFill>
         <p:spPr>
           <a:xfrm>
+            <a:off x="5979796" y="717621"/>
+            <a:ext cx="1351520" cy="977804"/>
+          </a:xfrm>
+          <a:prstGeom prst="rect">
+            <a:avLst/>
+          </a:prstGeom>
+        </p:spPr>
+      </p:pic>
+      <p:pic>
+        <p:nvPicPr>
+          <p:cNvPr id="56" name="Picture 55"/>
+          <p:cNvPicPr>
+            <a:picLocks noChangeAspect="1"/>
+          </p:cNvPicPr>
+          <p:nvPr/>
+        </p:nvPicPr>
+        <p:blipFill>
+          <a:blip r:embed="rId10" cstate="print">
+            <a:extLst>
+              <a:ext uri="{28A0092B-C50C-407E-A947-70E740481C1C}">
+                <a14:useLocalDpi xmlns:a14="http://schemas.microsoft.com/office/drawing/2010/main" val="0"/>
+              </a:ext>
+            </a:extLst>
+          </a:blip>
+          <a:stretch>
+            <a:fillRect/>
+          </a:stretch>
+        </p:blipFill>
+        <p:spPr>
+          <a:xfrm>
             <a:off x="10759984" y="792838"/>
             <a:ext cx="843057" cy="843057"/>
           </a:xfrm>
@@ -6577,47 +6885,15 @@
           </a:fontRef>
         </p:style>
       </p:cxnSp>
-      <p:pic>
-        <p:nvPicPr>
-          <p:cNvPr id="63" name="Picture 62"/>
-          <p:cNvPicPr>
-            <a:picLocks noChangeAspect="1"/>
-          </p:cNvPicPr>
-          <p:nvPr/>
-        </p:nvPicPr>
-        <p:blipFill>
-          <a:blip r:embed="rId10">
-            <a:extLst>
-              <a:ext uri="{28A0092B-C50C-407E-A947-70E740481C1C}">
-                <a14:useLocalDpi xmlns:a14="http://schemas.microsoft.com/office/drawing/2010/main" val="0"/>
-              </a:ext>
-            </a:extLst>
-          </a:blip>
-          <a:stretch>
-            <a:fillRect/>
-          </a:stretch>
-        </p:blipFill>
-        <p:spPr>
-          <a:xfrm>
-            <a:off x="3746838" y="33278"/>
-            <a:ext cx="709744" cy="709744"/>
-          </a:xfrm>
-          <a:prstGeom prst="rect">
-            <a:avLst/>
-          </a:prstGeom>
-        </p:spPr>
-      </p:pic>
       <p:cxnSp>
         <p:nvCxnSpPr>
           <p:cNvPr id="65" name="Straight Arrow Connector 64"/>
-          <p:cNvCxnSpPr>
-            <a:endCxn id="63" idx="1"/>
-          </p:cNvCxnSpPr>
+          <p:cNvCxnSpPr/>
           <p:nvPr/>
         </p:nvCxnSpPr>
         <p:spPr>
           <a:xfrm flipV="1">
-            <a:off x="3230088" y="388150"/>
+            <a:off x="3422690" y="581420"/>
             <a:ext cx="516750" cy="224173"/>
           </a:xfrm>
           <a:prstGeom prst="straightConnector1">
@@ -6642,42 +6918,10 @@
           </a:fontRef>
         </p:style>
       </p:cxnSp>
-      <p:pic>
-        <p:nvPicPr>
-          <p:cNvPr id="66" name="Picture 65"/>
-          <p:cNvPicPr>
-            <a:picLocks noChangeAspect="1"/>
-          </p:cNvPicPr>
-          <p:nvPr/>
-        </p:nvPicPr>
-        <p:blipFill>
-          <a:blip r:embed="rId10">
-            <a:extLst>
-              <a:ext uri="{28A0092B-C50C-407E-A947-70E740481C1C}">
-                <a14:useLocalDpi xmlns:a14="http://schemas.microsoft.com/office/drawing/2010/main" val="0"/>
-              </a:ext>
-            </a:extLst>
-          </a:blip>
-          <a:stretch>
-            <a:fillRect/>
-          </a:stretch>
-        </p:blipFill>
-        <p:spPr>
-          <a:xfrm>
-            <a:off x="3539031" y="2084756"/>
-            <a:ext cx="709744" cy="709744"/>
-          </a:xfrm>
-          <a:prstGeom prst="rect">
-            <a:avLst/>
-          </a:prstGeom>
-        </p:spPr>
-      </p:pic>
       <p:cxnSp>
         <p:nvCxnSpPr>
           <p:cNvPr id="67" name="Straight Arrow Connector 66"/>
-          <p:cNvCxnSpPr>
-            <a:endCxn id="66" idx="1"/>
-          </p:cNvCxnSpPr>
+          <p:cNvCxnSpPr/>
           <p:nvPr/>
         </p:nvCxnSpPr>
         <p:spPr>
@@ -6707,48 +6951,16 @@
           </a:fontRef>
         </p:style>
       </p:cxnSp>
-      <p:pic>
-        <p:nvPicPr>
-          <p:cNvPr id="68" name="Picture 67"/>
-          <p:cNvPicPr>
-            <a:picLocks noChangeAspect="1"/>
-          </p:cNvPicPr>
-          <p:nvPr/>
-        </p:nvPicPr>
-        <p:blipFill>
-          <a:blip r:embed="rId10">
-            <a:extLst>
-              <a:ext uri="{28A0092B-C50C-407E-A947-70E740481C1C}">
-                <a14:useLocalDpi xmlns:a14="http://schemas.microsoft.com/office/drawing/2010/main" val="0"/>
-              </a:ext>
-            </a:extLst>
-          </a:blip>
-          <a:stretch>
-            <a:fillRect/>
-          </a:stretch>
-        </p:blipFill>
-        <p:spPr>
-          <a:xfrm>
-            <a:off x="3851741" y="4393564"/>
-            <a:ext cx="709744" cy="709744"/>
-          </a:xfrm>
-          <a:prstGeom prst="rect">
-            <a:avLst/>
-          </a:prstGeom>
-        </p:spPr>
-      </p:pic>
       <p:cxnSp>
         <p:nvCxnSpPr>
           <p:cNvPr id="69" name="Straight Arrow Connector 68"/>
-          <p:cNvCxnSpPr>
-            <a:endCxn id="68" idx="1"/>
-          </p:cNvCxnSpPr>
+          <p:cNvCxnSpPr/>
           <p:nvPr/>
         </p:nvCxnSpPr>
         <p:spPr>
-          <a:xfrm flipV="1">
-            <a:off x="3334991" y="4748436"/>
-            <a:ext cx="516750" cy="224173"/>
+          <a:xfrm>
+            <a:off x="3953884" y="5820229"/>
+            <a:ext cx="487054" cy="347834"/>
           </a:xfrm>
           <a:prstGeom prst="straightConnector1">
             <a:avLst/>
@@ -6780,7 +6992,7 @@
         </p:nvSpPr>
         <p:spPr>
           <a:xfrm>
-            <a:off x="4561485" y="1849956"/>
+            <a:off x="4637010" y="1470024"/>
             <a:ext cx="415498" cy="369332"/>
           </a:xfrm>
           <a:prstGeom prst="rect">
@@ -6838,7 +7050,7 @@
         </p:nvSpPr>
         <p:spPr>
           <a:xfrm>
-            <a:off x="4429261" y="3195600"/>
+            <a:off x="4256389" y="3334376"/>
             <a:ext cx="415498" cy="369332"/>
           </a:xfrm>
           <a:prstGeom prst="rect">
@@ -6897,7 +7109,7 @@
           <p:nvPr/>
         </p:nvPicPr>
         <p:blipFill>
-          <a:blip r:embed="rId11">
+          <a:blip r:embed="rId11" cstate="print">
             <a:extLst>
               <a:ext uri="{28A0092B-C50C-407E-A947-70E740481C1C}">
                 <a14:useLocalDpi xmlns:a14="http://schemas.microsoft.com/office/drawing/2010/main" val="0"/>
@@ -7086,6 +7298,268 @@
           </a:prstGeom>
         </p:spPr>
       </p:pic>
+      <p:grpSp>
+        <p:nvGrpSpPr>
+          <p:cNvPr id="84" name="Group 83"/>
+          <p:cNvGrpSpPr/>
+          <p:nvPr/>
+        </p:nvGrpSpPr>
+        <p:grpSpPr>
+          <a:xfrm>
+            <a:off x="4401626" y="5709342"/>
+            <a:ext cx="1716533" cy="1012173"/>
+            <a:chOff x="3803165" y="83094"/>
+            <a:chExt cx="1716533" cy="1012173"/>
+          </a:xfrm>
+        </p:grpSpPr>
+        <p:pic>
+          <p:nvPicPr>
+            <p:cNvPr id="85" name="Picture 84"/>
+            <p:cNvPicPr>
+              <a:picLocks noChangeAspect="1"/>
+            </p:cNvPicPr>
+            <p:nvPr/>
+          </p:nvPicPr>
+          <p:blipFill>
+            <a:blip r:embed="rId3" cstate="print">
+              <a:extLst>
+                <a:ext uri="{28A0092B-C50C-407E-A947-70E740481C1C}">
+                  <a14:useLocalDpi xmlns:a14="http://schemas.microsoft.com/office/drawing/2010/main" val="0"/>
+                </a:ext>
+              </a:extLst>
+            </a:blip>
+            <a:stretch>
+              <a:fillRect/>
+            </a:stretch>
+          </p:blipFill>
+          <p:spPr>
+            <a:xfrm>
+              <a:off x="3803165" y="143982"/>
+              <a:ext cx="709744" cy="709744"/>
+            </a:xfrm>
+            <a:prstGeom prst="rect">
+              <a:avLst/>
+            </a:prstGeom>
+          </p:spPr>
+        </p:pic>
+        <p:cxnSp>
+          <p:nvCxnSpPr>
+            <p:cNvPr id="86" name="Straight Arrow Connector 85"/>
+            <p:cNvCxnSpPr/>
+            <p:nvPr/>
+          </p:nvCxnSpPr>
+          <p:spPr>
+            <a:xfrm flipV="1">
+              <a:off x="4361839" y="428779"/>
+              <a:ext cx="347772" cy="4342"/>
+            </a:xfrm>
+            <a:prstGeom prst="straightConnector1">
+              <a:avLst/>
+            </a:prstGeom>
+            <a:ln>
+              <a:tailEnd type="triangle"/>
+            </a:ln>
+          </p:spPr>
+          <p:style>
+            <a:lnRef idx="1">
+              <a:schemeClr val="accent1"/>
+            </a:lnRef>
+            <a:fillRef idx="0">
+              <a:schemeClr val="accent1"/>
+            </a:fillRef>
+            <a:effectRef idx="0">
+              <a:schemeClr val="accent1"/>
+            </a:effectRef>
+            <a:fontRef idx="minor">
+              <a:schemeClr val="tx1"/>
+            </a:fontRef>
+          </p:style>
+        </p:cxnSp>
+        <p:pic>
+          <p:nvPicPr>
+            <p:cNvPr id="87" name="Picture 86"/>
+            <p:cNvPicPr>
+              <a:picLocks noChangeAspect="1"/>
+            </p:cNvPicPr>
+            <p:nvPr/>
+          </p:nvPicPr>
+          <p:blipFill>
+            <a:blip r:embed="rId4">
+              <a:extLst>
+                <a:ext uri="{28A0092B-C50C-407E-A947-70E740481C1C}">
+                  <a14:useLocalDpi xmlns:a14="http://schemas.microsoft.com/office/drawing/2010/main" val="0"/>
+                </a:ext>
+              </a:extLst>
+            </a:blip>
+            <a:stretch>
+              <a:fillRect/>
+            </a:stretch>
+          </p:blipFill>
+          <p:spPr>
+            <a:xfrm>
+              <a:off x="4709611" y="83094"/>
+              <a:ext cx="709744" cy="709744"/>
+            </a:xfrm>
+            <a:prstGeom prst="rect">
+              <a:avLst/>
+            </a:prstGeom>
+          </p:spPr>
+        </p:pic>
+        <p:sp>
+          <p:nvSpPr>
+            <p:cNvPr id="88" name="TextBox 87"/>
+            <p:cNvSpPr txBox="1"/>
+            <p:nvPr/>
+          </p:nvSpPr>
+          <p:spPr>
+            <a:xfrm>
+              <a:off x="3939266" y="634354"/>
+              <a:ext cx="541238" cy="307777"/>
+            </a:xfrm>
+            <a:prstGeom prst="rect">
+              <a:avLst/>
+            </a:prstGeom>
+            <a:noFill/>
+          </p:spPr>
+          <p:txBody>
+            <a:bodyPr wrap="none" rtlCol="0">
+              <a:spAutoFit/>
+            </a:bodyPr>
+            <a:lstStyle/>
+            <a:p>
+              <a:r>
+                <a:rPr lang="en-US" sz="1400" dirty="0" smtClean="0"/>
+                <a:t>relay</a:t>
+              </a:r>
+              <a:endParaRPr lang="en-US" sz="1400" dirty="0"/>
+            </a:p>
+          </p:txBody>
+        </p:sp>
+        <p:sp>
+          <p:nvSpPr>
+            <p:cNvPr id="89" name="TextBox 88"/>
+            <p:cNvSpPr txBox="1"/>
+            <p:nvPr/>
+          </p:nvSpPr>
+          <p:spPr>
+            <a:xfrm>
+              <a:off x="4649010" y="787490"/>
+              <a:ext cx="870688" cy="307777"/>
+            </a:xfrm>
+            <a:prstGeom prst="rect">
+              <a:avLst/>
+            </a:prstGeom>
+            <a:noFill/>
+          </p:spPr>
+          <p:txBody>
+            <a:bodyPr wrap="none" rtlCol="0">
+              <a:spAutoFit/>
+            </a:bodyPr>
+            <a:lstStyle/>
+            <a:p>
+              <a:r>
+                <a:rPr lang="en-US" sz="1400" dirty="0" smtClean="0"/>
+                <a:t>actuators</a:t>
+              </a:r>
+              <a:endParaRPr lang="en-US" sz="1400" dirty="0"/>
+            </a:p>
+          </p:txBody>
+        </p:sp>
+      </p:grpSp>
+      <p:pic>
+        <p:nvPicPr>
+          <p:cNvPr id="30" name="Picture 29"/>
+          <p:cNvPicPr>
+            <a:picLocks noChangeAspect="1"/>
+          </p:cNvPicPr>
+          <p:nvPr/>
+        </p:nvPicPr>
+        <p:blipFill>
+          <a:blip r:embed="rId14" cstate="print">
+            <a:extLst>
+              <a:ext uri="{28A0092B-C50C-407E-A947-70E740481C1C}">
+                <a14:useLocalDpi xmlns:a14="http://schemas.microsoft.com/office/drawing/2010/main" val="0"/>
+              </a:ext>
+            </a:extLst>
+          </a:blip>
+          <a:stretch>
+            <a:fillRect/>
+          </a:stretch>
+        </p:blipFill>
+        <p:spPr>
+          <a:xfrm>
+            <a:off x="5247471" y="2484149"/>
+            <a:ext cx="1578587" cy="1304159"/>
+          </a:xfrm>
+          <a:prstGeom prst="rect">
+            <a:avLst/>
+          </a:prstGeom>
+        </p:spPr>
+      </p:pic>
+      <p:cxnSp>
+        <p:nvCxnSpPr>
+          <p:cNvPr id="90" name="Straight Arrow Connector 89"/>
+          <p:cNvCxnSpPr/>
+          <p:nvPr/>
+        </p:nvCxnSpPr>
+        <p:spPr>
+          <a:xfrm flipH="1">
+            <a:off x="5717833" y="3519042"/>
+            <a:ext cx="87086" cy="455251"/>
+          </a:xfrm>
+          <a:prstGeom prst="straightConnector1">
+            <a:avLst/>
+          </a:prstGeom>
+          <a:ln>
+            <a:headEnd type="triangle"/>
+            <a:tailEnd type="triangle"/>
+          </a:ln>
+        </p:spPr>
+        <p:style>
+          <a:lnRef idx="1">
+            <a:schemeClr val="accent1"/>
+          </a:lnRef>
+          <a:fillRef idx="0">
+            <a:schemeClr val="accent1"/>
+          </a:fillRef>
+          <a:effectRef idx="0">
+            <a:schemeClr val="accent1"/>
+          </a:effectRef>
+          <a:fontRef idx="minor">
+            <a:schemeClr val="tx1"/>
+          </a:fontRef>
+        </p:style>
+      </p:cxnSp>
+      <p:sp>
+        <p:nvSpPr>
+          <p:cNvPr id="91" name="TextBox 90"/>
+          <p:cNvSpPr txBox="1"/>
+          <p:nvPr/>
+        </p:nvSpPr>
+        <p:spPr>
+          <a:xfrm>
+            <a:off x="5119310" y="3519042"/>
+            <a:ext cx="695127" cy="369332"/>
+          </a:xfrm>
+          <a:prstGeom prst="rect">
+            <a:avLst/>
+          </a:prstGeom>
+          <a:noFill/>
+        </p:spPr>
+        <p:txBody>
+          <a:bodyPr wrap="none" rtlCol="0">
+            <a:spAutoFit/>
+          </a:bodyPr>
+          <a:lstStyle/>
+          <a:p>
+            <a:r>
+              <a:rPr lang="en-US" dirty="0" smtClean="0"/>
+              <a:t>UART</a:t>
+            </a:r>
+            <a:endParaRPr lang="en-US" dirty="0"/>
+          </a:p>
+        </p:txBody>
+      </p:sp>
     </p:spTree>
     <p:extLst>
       <p:ext uri="{BB962C8B-B14F-4D97-AF65-F5344CB8AC3E}">
@@ -7679,21 +8153,21 @@
                 <a:gridCol w="3257358">
                   <a:extLst>
                     <a:ext uri="{9D8B030D-6E8A-4147-A177-3AD203B41FA5}">
-                      <a16:colId xmlns:a16="http://schemas.microsoft.com/office/drawing/2014/main" val="2724298270"/>
+                      <a16:colId xmlns:a16="http://schemas.microsoft.com/office/drawing/2014/main" xmlns="" val="2724298270"/>
                     </a:ext>
                   </a:extLst>
                 </a:gridCol>
                 <a:gridCol w="3257358">
                   <a:extLst>
                     <a:ext uri="{9D8B030D-6E8A-4147-A177-3AD203B41FA5}">
-                      <a16:colId xmlns:a16="http://schemas.microsoft.com/office/drawing/2014/main" val="4102868576"/>
+                      <a16:colId xmlns:a16="http://schemas.microsoft.com/office/drawing/2014/main" xmlns="" val="4102868576"/>
                     </a:ext>
                   </a:extLst>
                 </a:gridCol>
                 <a:gridCol w="3257358">
                   <a:extLst>
                     <a:ext uri="{9D8B030D-6E8A-4147-A177-3AD203B41FA5}">
-                      <a16:colId xmlns:a16="http://schemas.microsoft.com/office/drawing/2014/main" val="1210860752"/>
+                      <a16:colId xmlns:a16="http://schemas.microsoft.com/office/drawing/2014/main" xmlns="" val="1210860752"/>
                     </a:ext>
                   </a:extLst>
                 </a:gridCol>
@@ -7750,7 +8224,7 @@
                 </a:tc>
                 <a:extLst>
                   <a:ext uri="{0D108BD9-81ED-4DB2-BD59-A6C34878D82A}">
-                    <a16:rowId xmlns:a16="http://schemas.microsoft.com/office/drawing/2014/main" val="1061089172"/>
+                    <a16:rowId xmlns:a16="http://schemas.microsoft.com/office/drawing/2014/main" xmlns="" val="1061089172"/>
                   </a:ext>
                 </a:extLst>
               </a:tr>
@@ -7823,7 +8297,7 @@
                 </a:tc>
                 <a:extLst>
                   <a:ext uri="{0D108BD9-81ED-4DB2-BD59-A6C34878D82A}">
-                    <a16:rowId xmlns:a16="http://schemas.microsoft.com/office/drawing/2014/main" val="2075331557"/>
+                    <a16:rowId xmlns:a16="http://schemas.microsoft.com/office/drawing/2014/main" xmlns="" val="2075331557"/>
                   </a:ext>
                 </a:extLst>
               </a:tr>
@@ -7879,7 +8353,7 @@
                 </a:tc>
                 <a:extLst>
                   <a:ext uri="{0D108BD9-81ED-4DB2-BD59-A6C34878D82A}">
-                    <a16:rowId xmlns:a16="http://schemas.microsoft.com/office/drawing/2014/main" val="1644948831"/>
+                    <a16:rowId xmlns:a16="http://schemas.microsoft.com/office/drawing/2014/main" xmlns="" val="1644948831"/>
                   </a:ext>
                 </a:extLst>
               </a:tr>
@@ -7935,7 +8409,7 @@
                 </a:tc>
                 <a:extLst>
                   <a:ext uri="{0D108BD9-81ED-4DB2-BD59-A6C34878D82A}">
-                    <a16:rowId xmlns:a16="http://schemas.microsoft.com/office/drawing/2014/main" val="91177799"/>
+                    <a16:rowId xmlns:a16="http://schemas.microsoft.com/office/drawing/2014/main" xmlns="" val="91177799"/>
                   </a:ext>
                 </a:extLst>
               </a:tr>
@@ -7991,7 +8465,7 @@
                 </a:tc>
                 <a:extLst>
                   <a:ext uri="{0D108BD9-81ED-4DB2-BD59-A6C34878D82A}">
-                    <a16:rowId xmlns:a16="http://schemas.microsoft.com/office/drawing/2014/main" val="2375620221"/>
+                    <a16:rowId xmlns:a16="http://schemas.microsoft.com/office/drawing/2014/main" xmlns="" val="2375620221"/>
                   </a:ext>
                 </a:extLst>
               </a:tr>
@@ -8047,7 +8521,7 @@
                 </a:tc>
                 <a:extLst>
                   <a:ext uri="{0D108BD9-81ED-4DB2-BD59-A6C34878D82A}">
-                    <a16:rowId xmlns:a16="http://schemas.microsoft.com/office/drawing/2014/main" val="2127423046"/>
+                    <a16:rowId xmlns:a16="http://schemas.microsoft.com/office/drawing/2014/main" xmlns="" val="2127423046"/>
                   </a:ext>
                 </a:extLst>
               </a:tr>
@@ -8148,14 +8622,14 @@
                 <a:gridCol w="2365828">
                   <a:extLst>
                     <a:ext uri="{9D8B030D-6E8A-4147-A177-3AD203B41FA5}">
-                      <a16:colId xmlns:a16="http://schemas.microsoft.com/office/drawing/2014/main" val="2957517704"/>
+                      <a16:colId xmlns:a16="http://schemas.microsoft.com/office/drawing/2014/main" xmlns="" val="2957517704"/>
                     </a:ext>
                   </a:extLst>
                 </a:gridCol>
                 <a:gridCol w="5762172">
                   <a:extLst>
                     <a:ext uri="{9D8B030D-6E8A-4147-A177-3AD203B41FA5}">
-                      <a16:colId xmlns:a16="http://schemas.microsoft.com/office/drawing/2014/main" val="2959448833"/>
+                      <a16:colId xmlns:a16="http://schemas.microsoft.com/office/drawing/2014/main" xmlns="" val="2959448833"/>
                     </a:ext>
                   </a:extLst>
                 </a:gridCol>
@@ -8194,7 +8668,7 @@
                 </a:tc>
                 <a:extLst>
                   <a:ext uri="{0D108BD9-81ED-4DB2-BD59-A6C34878D82A}">
-                    <a16:rowId xmlns:a16="http://schemas.microsoft.com/office/drawing/2014/main" val="3493983821"/>
+                    <a16:rowId xmlns:a16="http://schemas.microsoft.com/office/drawing/2014/main" xmlns="" val="3493983821"/>
                   </a:ext>
                 </a:extLst>
               </a:tr>
@@ -8259,7 +8733,7 @@
                 </a:tc>
                 <a:extLst>
                   <a:ext uri="{0D108BD9-81ED-4DB2-BD59-A6C34878D82A}">
-                    <a16:rowId xmlns:a16="http://schemas.microsoft.com/office/drawing/2014/main" val="1580518939"/>
+                    <a16:rowId xmlns:a16="http://schemas.microsoft.com/office/drawing/2014/main" xmlns="" val="1580518939"/>
                   </a:ext>
                 </a:extLst>
               </a:tr>
@@ -8332,7 +8806,7 @@
                 </a:tc>
                 <a:extLst>
                   <a:ext uri="{0D108BD9-81ED-4DB2-BD59-A6C34878D82A}">
-                    <a16:rowId xmlns:a16="http://schemas.microsoft.com/office/drawing/2014/main" val="2230040346"/>
+                    <a16:rowId xmlns:a16="http://schemas.microsoft.com/office/drawing/2014/main" xmlns="" val="2230040346"/>
                   </a:ext>
                 </a:extLst>
               </a:tr>
@@ -8405,7 +8879,7 @@
                 </a:tc>
                 <a:extLst>
                   <a:ext uri="{0D108BD9-81ED-4DB2-BD59-A6C34878D82A}">
-                    <a16:rowId xmlns:a16="http://schemas.microsoft.com/office/drawing/2014/main" val="2570328417"/>
+                    <a16:rowId xmlns:a16="http://schemas.microsoft.com/office/drawing/2014/main" xmlns="" val="2570328417"/>
                   </a:ext>
                 </a:extLst>
               </a:tr>
@@ -8486,7 +8960,7 @@
                 </a:tc>
                 <a:extLst>
                   <a:ext uri="{0D108BD9-81ED-4DB2-BD59-A6C34878D82A}">
-                    <a16:rowId xmlns:a16="http://schemas.microsoft.com/office/drawing/2014/main" val="614865113"/>
+                    <a16:rowId xmlns:a16="http://schemas.microsoft.com/office/drawing/2014/main" xmlns="" val="614865113"/>
                   </a:ext>
                 </a:extLst>
               </a:tr>
@@ -9123,14 +9597,14 @@
                 <a:gridCol w="5341257">
                   <a:extLst>
                     <a:ext uri="{9D8B030D-6E8A-4147-A177-3AD203B41FA5}">
-                      <a16:colId xmlns:a16="http://schemas.microsoft.com/office/drawing/2014/main" val="355922762"/>
+                      <a16:colId xmlns:a16="http://schemas.microsoft.com/office/drawing/2014/main" xmlns="" val="355922762"/>
                     </a:ext>
                   </a:extLst>
                 </a:gridCol>
                 <a:gridCol w="5341257">
                   <a:extLst>
                     <a:ext uri="{9D8B030D-6E8A-4147-A177-3AD203B41FA5}">
-                      <a16:colId xmlns:a16="http://schemas.microsoft.com/office/drawing/2014/main" val="2887717138"/>
+                      <a16:colId xmlns:a16="http://schemas.microsoft.com/office/drawing/2014/main" xmlns="" val="2887717138"/>
                     </a:ext>
                   </a:extLst>
                 </a:gridCol>
@@ -9173,7 +9647,7 @@
                 </a:tc>
                 <a:extLst>
                   <a:ext uri="{0D108BD9-81ED-4DB2-BD59-A6C34878D82A}">
-                    <a16:rowId xmlns:a16="http://schemas.microsoft.com/office/drawing/2014/main" val="781542941"/>
+                    <a16:rowId xmlns:a16="http://schemas.microsoft.com/office/drawing/2014/main" xmlns="" val="781542941"/>
                   </a:ext>
                 </a:extLst>
               </a:tr>
@@ -9443,7 +9917,7 @@
                 </a:tc>
                 <a:extLst>
                   <a:ext uri="{0D108BD9-81ED-4DB2-BD59-A6C34878D82A}">
-                    <a16:rowId xmlns:a16="http://schemas.microsoft.com/office/drawing/2014/main" val="3473623608"/>
+                    <a16:rowId xmlns:a16="http://schemas.microsoft.com/office/drawing/2014/main" xmlns="" val="3473623608"/>
                   </a:ext>
                 </a:extLst>
               </a:tr>
@@ -9615,14 +10089,14 @@
                 <a:gridCol w="1712686">
                   <a:extLst>
                     <a:ext uri="{9D8B030D-6E8A-4147-A177-3AD203B41FA5}">
-                      <a16:colId xmlns:a16="http://schemas.microsoft.com/office/drawing/2014/main" val="392866419"/>
+                      <a16:colId xmlns:a16="http://schemas.microsoft.com/office/drawing/2014/main" xmlns="" val="392866419"/>
                     </a:ext>
                   </a:extLst>
                 </a:gridCol>
                 <a:gridCol w="8873426">
                   <a:extLst>
                     <a:ext uri="{9D8B030D-6E8A-4147-A177-3AD203B41FA5}">
-                      <a16:colId xmlns:a16="http://schemas.microsoft.com/office/drawing/2014/main" val="3626155877"/>
+                      <a16:colId xmlns:a16="http://schemas.microsoft.com/office/drawing/2014/main" xmlns="" val="3626155877"/>
                     </a:ext>
                   </a:extLst>
                 </a:gridCol>
@@ -9664,7 +10138,7 @@
                 </a:tc>
                 <a:extLst>
                   <a:ext uri="{0D108BD9-81ED-4DB2-BD59-A6C34878D82A}">
-                    <a16:rowId xmlns:a16="http://schemas.microsoft.com/office/drawing/2014/main" val="3378398495"/>
+                    <a16:rowId xmlns:a16="http://schemas.microsoft.com/office/drawing/2014/main" xmlns="" val="3378398495"/>
                   </a:ext>
                 </a:extLst>
               </a:tr>
@@ -9772,7 +10246,7 @@
                 </a:tc>
                 <a:extLst>
                   <a:ext uri="{0D108BD9-81ED-4DB2-BD59-A6C34878D82A}">
-                    <a16:rowId xmlns:a16="http://schemas.microsoft.com/office/drawing/2014/main" val="3217190178"/>
+                    <a16:rowId xmlns:a16="http://schemas.microsoft.com/office/drawing/2014/main" xmlns="" val="3217190178"/>
                   </a:ext>
                 </a:extLst>
               </a:tr>
@@ -9880,7 +10354,7 @@
                 </a:tc>
                 <a:extLst>
                   <a:ext uri="{0D108BD9-81ED-4DB2-BD59-A6C34878D82A}">
-                    <a16:rowId xmlns:a16="http://schemas.microsoft.com/office/drawing/2014/main" val="2174416106"/>
+                    <a16:rowId xmlns:a16="http://schemas.microsoft.com/office/drawing/2014/main" xmlns="" val="2174416106"/>
                   </a:ext>
                 </a:extLst>
               </a:tr>
@@ -9988,7 +10462,7 @@
                 </a:tc>
                 <a:extLst>
                   <a:ext uri="{0D108BD9-81ED-4DB2-BD59-A6C34878D82A}">
-                    <a16:rowId xmlns:a16="http://schemas.microsoft.com/office/drawing/2014/main" val="3439451625"/>
+                    <a16:rowId xmlns:a16="http://schemas.microsoft.com/office/drawing/2014/main" xmlns="" val="3439451625"/>
                   </a:ext>
                 </a:extLst>
               </a:tr>
@@ -10096,7 +10570,7 @@
                 </a:tc>
                 <a:extLst>
                   <a:ext uri="{0D108BD9-81ED-4DB2-BD59-A6C34878D82A}">
-                    <a16:rowId xmlns:a16="http://schemas.microsoft.com/office/drawing/2014/main" val="654708714"/>
+                    <a16:rowId xmlns:a16="http://schemas.microsoft.com/office/drawing/2014/main" xmlns="" val="654708714"/>
                   </a:ext>
                 </a:extLst>
               </a:tr>
@@ -10320,14 +10794,14 @@
                 <a:gridCol w="4064000">
                   <a:extLst>
                     <a:ext uri="{9D8B030D-6E8A-4147-A177-3AD203B41FA5}">
-                      <a16:colId xmlns:a16="http://schemas.microsoft.com/office/drawing/2014/main" val="2395220621"/>
+                      <a16:colId xmlns:a16="http://schemas.microsoft.com/office/drawing/2014/main" xmlns="" val="2395220621"/>
                     </a:ext>
                   </a:extLst>
                 </a:gridCol>
                 <a:gridCol w="4064000">
                   <a:extLst>
                     <a:ext uri="{9D8B030D-6E8A-4147-A177-3AD203B41FA5}">
-                      <a16:colId xmlns:a16="http://schemas.microsoft.com/office/drawing/2014/main" val="728634953"/>
+                      <a16:colId xmlns:a16="http://schemas.microsoft.com/office/drawing/2014/main" xmlns="" val="728634953"/>
                     </a:ext>
                   </a:extLst>
                 </a:gridCol>
@@ -10361,7 +10835,7 @@
                 </a:tc>
                 <a:extLst>
                   <a:ext uri="{0D108BD9-81ED-4DB2-BD59-A6C34878D82A}">
-                    <a16:rowId xmlns:a16="http://schemas.microsoft.com/office/drawing/2014/main" val="2177191349"/>
+                    <a16:rowId xmlns:a16="http://schemas.microsoft.com/office/drawing/2014/main" xmlns="" val="2177191349"/>
                   </a:ext>
                 </a:extLst>
               </a:tr>
@@ -10508,7 +10982,7 @@
                 </a:tc>
                 <a:extLst>
                   <a:ext uri="{0D108BD9-81ED-4DB2-BD59-A6C34878D82A}">
-                    <a16:rowId xmlns:a16="http://schemas.microsoft.com/office/drawing/2014/main" val="1132785716"/>
+                    <a16:rowId xmlns:a16="http://schemas.microsoft.com/office/drawing/2014/main" xmlns="" val="1132785716"/>
                   </a:ext>
                 </a:extLst>
               </a:tr>
@@ -10684,14 +11158,14 @@
                 <a:gridCol w="5145315">
                   <a:extLst>
                     <a:ext uri="{9D8B030D-6E8A-4147-A177-3AD203B41FA5}">
-                      <a16:colId xmlns:a16="http://schemas.microsoft.com/office/drawing/2014/main" val="138156462"/>
+                      <a16:colId xmlns:a16="http://schemas.microsoft.com/office/drawing/2014/main" xmlns="" val="138156462"/>
                     </a:ext>
                   </a:extLst>
                 </a:gridCol>
                 <a:gridCol w="5145315">
                   <a:extLst>
                     <a:ext uri="{9D8B030D-6E8A-4147-A177-3AD203B41FA5}">
-                      <a16:colId xmlns:a16="http://schemas.microsoft.com/office/drawing/2014/main" val="313805466"/>
+                      <a16:colId xmlns:a16="http://schemas.microsoft.com/office/drawing/2014/main" xmlns="" val="313805466"/>
                     </a:ext>
                   </a:extLst>
                 </a:gridCol>
@@ -10725,7 +11199,7 @@
                 </a:tc>
                 <a:extLst>
                   <a:ext uri="{0D108BD9-81ED-4DB2-BD59-A6C34878D82A}">
-                    <a16:rowId xmlns:a16="http://schemas.microsoft.com/office/drawing/2014/main" val="3204291817"/>
+                    <a16:rowId xmlns:a16="http://schemas.microsoft.com/office/drawing/2014/main" xmlns="" val="3204291817"/>
                   </a:ext>
                 </a:extLst>
               </a:tr>
@@ -10851,7 +11325,7 @@
                 </a:tc>
                 <a:extLst>
                   <a:ext uri="{0D108BD9-81ED-4DB2-BD59-A6C34878D82A}">
-                    <a16:rowId xmlns:a16="http://schemas.microsoft.com/office/drawing/2014/main" val="2746817929"/>
+                    <a16:rowId xmlns:a16="http://schemas.microsoft.com/office/drawing/2014/main" xmlns="" val="2746817929"/>
                   </a:ext>
                 </a:extLst>
               </a:tr>
@@ -10991,7 +11465,7 @@
           <p:nvPr/>
         </p:nvPicPr>
         <p:blipFill>
-          <a:blip r:embed="rId5">
+          <a:blip r:embed="rId5" cstate="print">
             <a:extLst>
               <a:ext uri="{28A0092B-C50C-407E-A947-70E740481C1C}">
                 <a14:useLocalDpi xmlns:a14="http://schemas.microsoft.com/office/drawing/2010/main" val="0"/>

</xml_diff>